<commit_message>
Hands On Demos for Day 12
</commit_message>
<xml_diff>
--- a/Day 11/Slides/8. JPA Annotations and How to Use Them/jpa-annotations-and-how-to-use-them-slides.pptx
+++ b/Day 11/Slides/8. JPA Annotations and How to Use Them/jpa-annotations-and-how-to-use-them-slides.pptx
@@ -4003,8 +4003,8 @@
         </p:nvSpPr>
         <p:spPr>
           <a:xfrm>
-            <a:off x="1147710" y="4016496"/>
-            <a:ext cx="16388080" cy="1885314"/>
+            <a:off x="1147445" y="4016375"/>
+            <a:ext cx="17976850" cy="1889760"/>
           </a:xfrm>
           <a:prstGeom prst="rect">
             <a:avLst/>
@@ -4052,7 +4052,27 @@
                 <a:latin typeface="Courier New" panose="02070309020205020404"/>
                 <a:cs typeface="Courier New" panose="02070309020205020404"/>
               </a:rPr>
-              <a:t>name=Regstration.FIND_REGISTRATION_REPORTS,</a:t>
+              <a:t>name=Reg</a:t>
+            </a:r>
+            <a:r>
+              <a:rPr lang="en-US" sz="3950" spc="-5" dirty="0">
+                <a:solidFill>
+                  <a:srgbClr val="000000"/>
+                </a:solidFill>
+                <a:latin typeface="Courier New" panose="02070309020205020404"/>
+                <a:cs typeface="Courier New" panose="02070309020205020404"/>
+              </a:rPr>
+              <a:t>i</a:t>
+            </a:r>
+            <a:r>
+              <a:rPr sz="3950" spc="-5" dirty="0">
+                <a:solidFill>
+                  <a:srgbClr val="000000"/>
+                </a:solidFill>
+                <a:latin typeface="Courier New" panose="02070309020205020404"/>
+                <a:cs typeface="Courier New" panose="02070309020205020404"/>
+              </a:rPr>
+              <a:t>stration.FIND_REGISTRATION_REPORTS,</a:t>
             </a:r>
             <a:endParaRPr sz="3950">
               <a:latin typeface="Courier New" panose="02070309020205020404"/>
@@ -4116,7 +4136,27 @@
                 <a:latin typeface="Courier New" panose="02070309020205020404"/>
                 <a:cs typeface="Courier New" panose="02070309020205020404"/>
               </a:rPr>
-              <a:t>Regstration.FIND_REGISTRATION_REPORTS_JPQL)})</a:t>
+              <a:t>Reg</a:t>
+            </a:r>
+            <a:r>
+              <a:rPr lang="en-US" sz="3950" dirty="0">
+                <a:solidFill>
+                  <a:srgbClr val="000000"/>
+                </a:solidFill>
+                <a:latin typeface="Courier New" panose="02070309020205020404"/>
+                <a:cs typeface="Courier New" panose="02070309020205020404"/>
+              </a:rPr>
+              <a:t>i</a:t>
+            </a:r>
+            <a:r>
+              <a:rPr sz="3950" dirty="0">
+                <a:solidFill>
+                  <a:srgbClr val="000000"/>
+                </a:solidFill>
+                <a:latin typeface="Courier New" panose="02070309020205020404"/>
+                <a:cs typeface="Courier New" panose="02070309020205020404"/>
+              </a:rPr>
+              <a:t>stration.FIND_REGISTRATION_REPORTS_JPQL)})</a:t>
             </a:r>
             <a:endParaRPr sz="3950">
               <a:latin typeface="Courier New" panose="02070309020205020404"/>

</xml_diff>